<commit_message>
zavrsne vjezbe javscript, css i html
</commit_message>
<xml_diff>
--- a/Bootcamp/css-uvod/css-uvod.pptx
+++ b/Bootcamp/css-uvod/css-uvod.pptx
@@ -5,7 +5,7 @@
     <p:sldMasterId id="2147483648" r:id="rId4"/>
   </p:sldMasterIdLst>
   <p:notesMasterIdLst>
-    <p:notesMasterId r:id="rId43"/>
+    <p:notesMasterId r:id="rId46"/>
   </p:notesMasterIdLst>
   <p:sldIdLst>
     <p:sldId id="304" r:id="rId5"/>
@@ -45,7 +45,10 @@
     <p:sldId id="342" r:id="rId39"/>
     <p:sldId id="343" r:id="rId40"/>
     <p:sldId id="344" r:id="rId41"/>
-    <p:sldId id="345" r:id="rId42"/>
+    <p:sldId id="346" r:id="rId42"/>
+    <p:sldId id="347" r:id="rId43"/>
+    <p:sldId id="348" r:id="rId44"/>
+    <p:sldId id="345" r:id="rId45"/>
   </p:sldIdLst>
   <p:sldSz cx="12192000" cy="6858000"/>
   <p:notesSz cx="6858000" cy="9144000"/>
@@ -189,6 +192,9 @@
             <p14:sldId id="342"/>
             <p14:sldId id="343"/>
             <p14:sldId id="344"/>
+            <p14:sldId id="346"/>
+            <p14:sldId id="347"/>
+            <p14:sldId id="348"/>
             <p14:sldId id="345"/>
           </p14:sldIdLst>
         </p14:section>
@@ -294,7 +300,7 @@
           <a:p>
             <a:fld id="{B2A70591-2E3C-5F42-A4E1-C0F5A0F4E5DB}" type="datetimeFigureOut">
               <a:rPr lang="en-US" smtClean="0"/>
-              <a:t>3/10/2025</a:t>
+              <a:t>4/6/2025</a:t>
             </a:fld>
             <a:endParaRPr lang="en-US"/>
           </a:p>
@@ -4143,6 +4149,381 @@
 </p:notes>
 </file>
 
+<file path=ppt/notesSlides/notesSlide37.xml><?xml version="1.0" encoding="utf-8"?>
+<p:notes xmlns:a="http://schemas.openxmlformats.org/drawingml/2006/main" xmlns:r="http://schemas.openxmlformats.org/officeDocument/2006/relationships" xmlns:p="http://schemas.openxmlformats.org/presentationml/2006/main">
+  <p:cSld>
+    <p:spTree>
+      <p:nvGrpSpPr>
+        <p:cNvPr id="1" name="">
+          <a:extLst>
+            <a:ext uri="{FF2B5EF4-FFF2-40B4-BE49-F238E27FC236}">
+              <a16:creationId xmlns:a16="http://schemas.microsoft.com/office/drawing/2014/main" id="{3507BF49-70A6-7451-9238-1D6D1D1C9C97}"/>
+            </a:ext>
+          </a:extLst>
+        </p:cNvPr>
+        <p:cNvGrpSpPr/>
+        <p:nvPr/>
+      </p:nvGrpSpPr>
+      <p:grpSpPr>
+        <a:xfrm>
+          <a:off x="0" y="0"/>
+          <a:ext cx="0" cy="0"/>
+          <a:chOff x="0" y="0"/>
+          <a:chExt cx="0" cy="0"/>
+        </a:xfrm>
+      </p:grpSpPr>
+      <p:sp>
+        <p:nvSpPr>
+          <p:cNvPr id="2" name="Slide Image Placeholder 1">
+            <a:extLst>
+              <a:ext uri="{FF2B5EF4-FFF2-40B4-BE49-F238E27FC236}">
+                <a16:creationId xmlns:a16="http://schemas.microsoft.com/office/drawing/2014/main" id="{09F34A97-F9CB-C213-302D-556177D31DCE}"/>
+              </a:ext>
+            </a:extLst>
+          </p:cNvPr>
+          <p:cNvSpPr>
+            <a:spLocks noGrp="1" noRot="1" noChangeAspect="1"/>
+          </p:cNvSpPr>
+          <p:nvPr>
+            <p:ph type="sldImg"/>
+          </p:nvPr>
+        </p:nvSpPr>
+        <p:spPr/>
+      </p:sp>
+      <p:sp>
+        <p:nvSpPr>
+          <p:cNvPr id="3" name="Notes Placeholder 2">
+            <a:extLst>
+              <a:ext uri="{FF2B5EF4-FFF2-40B4-BE49-F238E27FC236}">
+                <a16:creationId xmlns:a16="http://schemas.microsoft.com/office/drawing/2014/main" id="{0F7045BB-39BF-04C4-A712-4A6A05E2DE77}"/>
+              </a:ext>
+            </a:extLst>
+          </p:cNvPr>
+          <p:cNvSpPr>
+            <a:spLocks noGrp="1"/>
+          </p:cNvSpPr>
+          <p:nvPr>
+            <p:ph type="body" idx="1"/>
+          </p:nvPr>
+        </p:nvSpPr>
+        <p:spPr/>
+        <p:txBody>
+          <a:bodyPr/>
+          <a:lstStyle/>
+          <a:p>
+            <a:r>
+              <a:rPr lang="hr-HR" dirty="0"/>
+              <a:t>https://omatsuri.app/</a:t>
+            </a:r>
+            <a:endParaRPr lang="en-US" dirty="0"/>
+          </a:p>
+          <a:p>
+            <a:r>
+              <a:rPr lang="hr-HR" dirty="0"/>
+              <a:t>https://devdocs.io/html/</a:t>
+            </a:r>
+            <a:endParaRPr lang="en-US" dirty="0"/>
+          </a:p>
+          <a:p>
+            <a:r>
+              <a:rPr lang="hr-HR" dirty="0"/>
+              <a:t>https://htmlrev.com/</a:t>
+            </a:r>
+            <a:endParaRPr lang="en-US" dirty="0"/>
+          </a:p>
+          <a:p>
+            <a:r>
+              <a:rPr lang="hr-HR" dirty="0"/>
+              <a:t>https://uiverse.io/</a:t>
+            </a:r>
+          </a:p>
+        </p:txBody>
+      </p:sp>
+      <p:sp>
+        <p:nvSpPr>
+          <p:cNvPr id="4" name="Slide Number Placeholder 3">
+            <a:extLst>
+              <a:ext uri="{FF2B5EF4-FFF2-40B4-BE49-F238E27FC236}">
+                <a16:creationId xmlns:a16="http://schemas.microsoft.com/office/drawing/2014/main" id="{36EC2B2E-F98D-C360-E222-8CE19463E66F}"/>
+              </a:ext>
+            </a:extLst>
+          </p:cNvPr>
+          <p:cNvSpPr>
+            <a:spLocks noGrp="1"/>
+          </p:cNvSpPr>
+          <p:nvPr>
+            <p:ph type="sldNum" sz="quarter" idx="5"/>
+          </p:nvPr>
+        </p:nvSpPr>
+        <p:spPr/>
+        <p:txBody>
+          <a:bodyPr/>
+          <a:lstStyle/>
+          <a:p>
+            <a:fld id="{343B951A-A665-1949-AEDB-B62DC9BE7F13}" type="slidenum">
+              <a:rPr lang="en-US" smtClean="0"/>
+              <a:t>38</a:t>
+            </a:fld>
+            <a:endParaRPr lang="en-US"/>
+          </a:p>
+        </p:txBody>
+      </p:sp>
+    </p:spTree>
+    <p:extLst>
+      <p:ext uri="{BB962C8B-B14F-4D97-AF65-F5344CB8AC3E}">
+        <p14:creationId xmlns:p14="http://schemas.microsoft.com/office/powerpoint/2010/main" val="1631787056"/>
+      </p:ext>
+    </p:extLst>
+  </p:cSld>
+  <p:clrMapOvr>
+    <a:masterClrMapping/>
+  </p:clrMapOvr>
+</p:notes>
+</file>
+
+<file path=ppt/notesSlides/notesSlide38.xml><?xml version="1.0" encoding="utf-8"?>
+<p:notes xmlns:a="http://schemas.openxmlformats.org/drawingml/2006/main" xmlns:r="http://schemas.openxmlformats.org/officeDocument/2006/relationships" xmlns:p="http://schemas.openxmlformats.org/presentationml/2006/main">
+  <p:cSld>
+    <p:spTree>
+      <p:nvGrpSpPr>
+        <p:cNvPr id="1" name="">
+          <a:extLst>
+            <a:ext uri="{FF2B5EF4-FFF2-40B4-BE49-F238E27FC236}">
+              <a16:creationId xmlns:a16="http://schemas.microsoft.com/office/drawing/2014/main" id="{B4A72BC6-D8F4-BCE2-251E-237E54C1C7AC}"/>
+            </a:ext>
+          </a:extLst>
+        </p:cNvPr>
+        <p:cNvGrpSpPr/>
+        <p:nvPr/>
+      </p:nvGrpSpPr>
+      <p:grpSpPr>
+        <a:xfrm>
+          <a:off x="0" y="0"/>
+          <a:ext cx="0" cy="0"/>
+          <a:chOff x="0" y="0"/>
+          <a:chExt cx="0" cy="0"/>
+        </a:xfrm>
+      </p:grpSpPr>
+      <p:sp>
+        <p:nvSpPr>
+          <p:cNvPr id="2" name="Slide Image Placeholder 1">
+            <a:extLst>
+              <a:ext uri="{FF2B5EF4-FFF2-40B4-BE49-F238E27FC236}">
+                <a16:creationId xmlns:a16="http://schemas.microsoft.com/office/drawing/2014/main" id="{DC891147-A549-DCF4-BC75-C6353636754A}"/>
+              </a:ext>
+            </a:extLst>
+          </p:cNvPr>
+          <p:cNvSpPr>
+            <a:spLocks noGrp="1" noRot="1" noChangeAspect="1"/>
+          </p:cNvSpPr>
+          <p:nvPr>
+            <p:ph type="sldImg"/>
+          </p:nvPr>
+        </p:nvSpPr>
+        <p:spPr/>
+      </p:sp>
+      <p:sp>
+        <p:nvSpPr>
+          <p:cNvPr id="3" name="Notes Placeholder 2">
+            <a:extLst>
+              <a:ext uri="{FF2B5EF4-FFF2-40B4-BE49-F238E27FC236}">
+                <a16:creationId xmlns:a16="http://schemas.microsoft.com/office/drawing/2014/main" id="{CA621873-6171-B1F6-ED54-D0858B9F1B7A}"/>
+              </a:ext>
+            </a:extLst>
+          </p:cNvPr>
+          <p:cNvSpPr>
+            <a:spLocks noGrp="1"/>
+          </p:cNvSpPr>
+          <p:nvPr>
+            <p:ph type="body" idx="1"/>
+          </p:nvPr>
+        </p:nvSpPr>
+        <p:spPr/>
+        <p:txBody>
+          <a:bodyPr/>
+          <a:lstStyle/>
+          <a:p>
+            <a:r>
+              <a:rPr lang="hr-HR" dirty="0"/>
+              <a:t>https://omatsuri.app/</a:t>
+            </a:r>
+            <a:endParaRPr lang="en-US" dirty="0"/>
+          </a:p>
+          <a:p>
+            <a:r>
+              <a:rPr lang="hr-HR" dirty="0"/>
+              <a:t>https://devdocs.io/html/</a:t>
+            </a:r>
+            <a:endParaRPr lang="en-US" dirty="0"/>
+          </a:p>
+          <a:p>
+            <a:r>
+              <a:rPr lang="hr-HR" dirty="0"/>
+              <a:t>https://htmlrev.com/</a:t>
+            </a:r>
+            <a:endParaRPr lang="en-US" dirty="0"/>
+          </a:p>
+          <a:p>
+            <a:r>
+              <a:rPr lang="hr-HR" dirty="0"/>
+              <a:t>https://uiverse.io/</a:t>
+            </a:r>
+          </a:p>
+        </p:txBody>
+      </p:sp>
+      <p:sp>
+        <p:nvSpPr>
+          <p:cNvPr id="4" name="Slide Number Placeholder 3">
+            <a:extLst>
+              <a:ext uri="{FF2B5EF4-FFF2-40B4-BE49-F238E27FC236}">
+                <a16:creationId xmlns:a16="http://schemas.microsoft.com/office/drawing/2014/main" id="{3B63D879-04B5-9FCE-A62F-4A38AA1D0908}"/>
+              </a:ext>
+            </a:extLst>
+          </p:cNvPr>
+          <p:cNvSpPr>
+            <a:spLocks noGrp="1"/>
+          </p:cNvSpPr>
+          <p:nvPr>
+            <p:ph type="sldNum" sz="quarter" idx="5"/>
+          </p:nvPr>
+        </p:nvSpPr>
+        <p:spPr/>
+        <p:txBody>
+          <a:bodyPr/>
+          <a:lstStyle/>
+          <a:p>
+            <a:fld id="{343B951A-A665-1949-AEDB-B62DC9BE7F13}" type="slidenum">
+              <a:rPr lang="en-US" smtClean="0"/>
+              <a:t>39</a:t>
+            </a:fld>
+            <a:endParaRPr lang="en-US"/>
+          </a:p>
+        </p:txBody>
+      </p:sp>
+    </p:spTree>
+    <p:extLst>
+      <p:ext uri="{BB962C8B-B14F-4D97-AF65-F5344CB8AC3E}">
+        <p14:creationId xmlns:p14="http://schemas.microsoft.com/office/powerpoint/2010/main" val="695565906"/>
+      </p:ext>
+    </p:extLst>
+  </p:cSld>
+  <p:clrMapOvr>
+    <a:masterClrMapping/>
+  </p:clrMapOvr>
+</p:notes>
+</file>
+
+<file path=ppt/notesSlides/notesSlide39.xml><?xml version="1.0" encoding="utf-8"?>
+<p:notes xmlns:a="http://schemas.openxmlformats.org/drawingml/2006/main" xmlns:r="http://schemas.openxmlformats.org/officeDocument/2006/relationships" xmlns:p="http://schemas.openxmlformats.org/presentationml/2006/main">
+  <p:cSld>
+    <p:spTree>
+      <p:nvGrpSpPr>
+        <p:cNvPr id="1" name="">
+          <a:extLst>
+            <a:ext uri="{FF2B5EF4-FFF2-40B4-BE49-F238E27FC236}">
+              <a16:creationId xmlns:a16="http://schemas.microsoft.com/office/drawing/2014/main" id="{4AF993B9-0943-CBAE-1311-449301D3984F}"/>
+            </a:ext>
+          </a:extLst>
+        </p:cNvPr>
+        <p:cNvGrpSpPr/>
+        <p:nvPr/>
+      </p:nvGrpSpPr>
+      <p:grpSpPr>
+        <a:xfrm>
+          <a:off x="0" y="0"/>
+          <a:ext cx="0" cy="0"/>
+          <a:chOff x="0" y="0"/>
+          <a:chExt cx="0" cy="0"/>
+        </a:xfrm>
+      </p:grpSpPr>
+      <p:sp>
+        <p:nvSpPr>
+          <p:cNvPr id="2" name="Slide Image Placeholder 1">
+            <a:extLst>
+              <a:ext uri="{FF2B5EF4-FFF2-40B4-BE49-F238E27FC236}">
+                <a16:creationId xmlns:a16="http://schemas.microsoft.com/office/drawing/2014/main" id="{BF21093A-0C50-3B92-112F-C5F90916F0CD}"/>
+              </a:ext>
+            </a:extLst>
+          </p:cNvPr>
+          <p:cNvSpPr>
+            <a:spLocks noGrp="1" noRot="1" noChangeAspect="1"/>
+          </p:cNvSpPr>
+          <p:nvPr>
+            <p:ph type="sldImg"/>
+          </p:nvPr>
+        </p:nvSpPr>
+        <p:spPr/>
+      </p:sp>
+      <p:sp>
+        <p:nvSpPr>
+          <p:cNvPr id="3" name="Notes Placeholder 2">
+            <a:extLst>
+              <a:ext uri="{FF2B5EF4-FFF2-40B4-BE49-F238E27FC236}">
+                <a16:creationId xmlns:a16="http://schemas.microsoft.com/office/drawing/2014/main" id="{C414F54C-A881-72BA-4D7E-1A6DB042D714}"/>
+              </a:ext>
+            </a:extLst>
+          </p:cNvPr>
+          <p:cNvSpPr>
+            <a:spLocks noGrp="1"/>
+          </p:cNvSpPr>
+          <p:nvPr>
+            <p:ph type="body" idx="1"/>
+          </p:nvPr>
+        </p:nvSpPr>
+        <p:spPr/>
+        <p:txBody>
+          <a:bodyPr/>
+          <a:lstStyle/>
+          <a:p>
+            <a:r>
+              <a:rPr lang="hr-HR" dirty="0"/>
+              <a:t>https://bulma.io/documentation/customize/with-sass/</a:t>
+            </a:r>
+          </a:p>
+        </p:txBody>
+      </p:sp>
+      <p:sp>
+        <p:nvSpPr>
+          <p:cNvPr id="4" name="Slide Number Placeholder 3">
+            <a:extLst>
+              <a:ext uri="{FF2B5EF4-FFF2-40B4-BE49-F238E27FC236}">
+                <a16:creationId xmlns:a16="http://schemas.microsoft.com/office/drawing/2014/main" id="{E9430848-9AF3-D822-65AC-28E2526564AB}"/>
+              </a:ext>
+            </a:extLst>
+          </p:cNvPr>
+          <p:cNvSpPr>
+            <a:spLocks noGrp="1"/>
+          </p:cNvSpPr>
+          <p:nvPr>
+            <p:ph type="sldNum" sz="quarter" idx="5"/>
+          </p:nvPr>
+        </p:nvSpPr>
+        <p:spPr/>
+        <p:txBody>
+          <a:bodyPr/>
+          <a:lstStyle/>
+          <a:p>
+            <a:fld id="{343B951A-A665-1949-AEDB-B62DC9BE7F13}" type="slidenum">
+              <a:rPr lang="en-US" smtClean="0"/>
+              <a:t>40</a:t>
+            </a:fld>
+            <a:endParaRPr lang="en-US"/>
+          </a:p>
+        </p:txBody>
+      </p:sp>
+    </p:spTree>
+    <p:extLst>
+      <p:ext uri="{BB962C8B-B14F-4D97-AF65-F5344CB8AC3E}">
+        <p14:creationId xmlns:p14="http://schemas.microsoft.com/office/powerpoint/2010/main" val="2527724130"/>
+      </p:ext>
+    </p:extLst>
+  </p:cSld>
+  <p:clrMapOvr>
+    <a:masterClrMapping/>
+  </p:clrMapOvr>
+</p:notes>
+</file>
+
 <file path=ppt/notesSlides/notesSlide4.xml><?xml version="1.0" encoding="utf-8"?>
 <p:notes xmlns:a="http://schemas.openxmlformats.org/drawingml/2006/main" xmlns:r="http://schemas.openxmlformats.org/officeDocument/2006/relationships" xmlns:p="http://schemas.openxmlformats.org/presentationml/2006/main">
   <p:cSld>
@@ -4246,6 +4627,104 @@
     <p:extLst>
       <p:ext uri="{BB962C8B-B14F-4D97-AF65-F5344CB8AC3E}">
         <p14:creationId xmlns:p14="http://schemas.microsoft.com/office/powerpoint/2010/main" val="4078017433"/>
+      </p:ext>
+    </p:extLst>
+  </p:cSld>
+  <p:clrMapOvr>
+    <a:masterClrMapping/>
+  </p:clrMapOvr>
+</p:notes>
+</file>
+
+<file path=ppt/notesSlides/notesSlide40.xml><?xml version="1.0" encoding="utf-8"?>
+<p:notes xmlns:a="http://schemas.openxmlformats.org/drawingml/2006/main" xmlns:r="http://schemas.openxmlformats.org/officeDocument/2006/relationships" xmlns:p="http://schemas.openxmlformats.org/presentationml/2006/main">
+  <p:cSld>
+    <p:spTree>
+      <p:nvGrpSpPr>
+        <p:cNvPr id="1" name=""/>
+        <p:cNvGrpSpPr/>
+        <p:nvPr/>
+      </p:nvGrpSpPr>
+      <p:grpSpPr>
+        <a:xfrm>
+          <a:off x="0" y="0"/>
+          <a:ext cx="0" cy="0"/>
+          <a:chOff x="0" y="0"/>
+          <a:chExt cx="0" cy="0"/>
+        </a:xfrm>
+      </p:grpSpPr>
+      <p:sp>
+        <p:nvSpPr>
+          <p:cNvPr id="2" name="Slide Image Placeholder 1"/>
+          <p:cNvSpPr>
+            <a:spLocks noGrp="1" noRot="1" noChangeAspect="1"/>
+          </p:cNvSpPr>
+          <p:nvPr>
+            <p:ph type="sldImg"/>
+          </p:nvPr>
+        </p:nvSpPr>
+        <p:spPr/>
+      </p:sp>
+      <p:sp>
+        <p:nvSpPr>
+          <p:cNvPr id="3" name="Notes Placeholder 2"/>
+          <p:cNvSpPr>
+            <a:spLocks noGrp="1"/>
+          </p:cNvSpPr>
+          <p:nvPr>
+            <p:ph type="body" idx="1"/>
+          </p:nvPr>
+        </p:nvSpPr>
+        <p:spPr/>
+        <p:txBody>
+          <a:bodyPr/>
+          <a:lstStyle/>
+          <a:p>
+            <a:r>
+              <a:rPr lang="hr-HR" dirty="0"/>
+              <a:t>https://bulma.io/documentation/customize/with-sass/</a:t>
+            </a:r>
+            <a:br>
+              <a:rPr lang="en-US" dirty="0"/>
+            </a:br>
+            <a:br>
+              <a:rPr lang="en-US" dirty="0"/>
+            </a:br>
+            <a:r>
+              <a:rPr lang="en-US" dirty="0"/>
+              <a:t>https://docs.google.com/document/d/1docqD8XJ99sMyiidIl_XeWs7T5rO3MFK8oVQ7IsoDg4/edit?usp=sharing</a:t>
+            </a:r>
+            <a:endParaRPr lang="hr-HR" dirty="0"/>
+          </a:p>
+        </p:txBody>
+      </p:sp>
+      <p:sp>
+        <p:nvSpPr>
+          <p:cNvPr id="4" name="Slide Number Placeholder 3"/>
+          <p:cNvSpPr>
+            <a:spLocks noGrp="1"/>
+          </p:cNvSpPr>
+          <p:nvPr>
+            <p:ph type="sldNum" sz="quarter" idx="5"/>
+          </p:nvPr>
+        </p:nvSpPr>
+        <p:spPr/>
+        <p:txBody>
+          <a:bodyPr/>
+          <a:lstStyle/>
+          <a:p>
+            <a:fld id="{343B951A-A665-1949-AEDB-B62DC9BE7F13}" type="slidenum">
+              <a:rPr lang="en-US" smtClean="0"/>
+              <a:t>41</a:t>
+            </a:fld>
+            <a:endParaRPr lang="en-US"/>
+          </a:p>
+        </p:txBody>
+      </p:sp>
+    </p:spTree>
+    <p:extLst>
+      <p:ext uri="{BB962C8B-B14F-4D97-AF65-F5344CB8AC3E}">
+        <p14:creationId xmlns:p14="http://schemas.microsoft.com/office/powerpoint/2010/main" val="672910685"/>
       </p:ext>
     </p:extLst>
   </p:cSld>
@@ -5495,7 +5974,7 @@
                 <a:ea typeface="Open Sans" panose="020B0606030504020204" pitchFamily="34" charset="0"/>
                 <a:cs typeface="Open Sans" panose="020B0606030504020204" pitchFamily="34" charset="0"/>
               </a:rPr>
-              <a:t>10/03/2025</a:t>
+              <a:t>06/04/2025</a:t>
             </a:fld>
             <a:endParaRPr lang="en-GB" sz="1800" b="0" i="0" kern="1200" dirty="0">
               <a:solidFill>
@@ -6240,7 +6719,7 @@
                 <a:ea typeface="Open Sans" panose="020B0606030504020204" pitchFamily="34" charset="0"/>
                 <a:cs typeface="Open Sans" panose="020B0606030504020204" pitchFamily="34" charset="0"/>
               </a:rPr>
-              <a:t>10/03/2025</a:t>
+              <a:t>06/04/2025</a:t>
             </a:fld>
             <a:endParaRPr lang="en-GB" sz="1800" b="0" i="0" kern="1200" dirty="0">
               <a:solidFill>
@@ -6763,7 +7242,7 @@
                 <a:ea typeface="Open Sans" panose="020B0606030504020204" pitchFamily="34" charset="0"/>
                 <a:cs typeface="Open Sans" panose="020B0606030504020204" pitchFamily="34" charset="0"/>
               </a:rPr>
-              <a:t>10/03/2025</a:t>
+              <a:t>06/04/2025</a:t>
             </a:fld>
             <a:endParaRPr lang="en-GB" sz="1800" b="0" i="0" kern="1200" dirty="0">
               <a:solidFill>
@@ -7729,7 +8208,7 @@
                 <a:ea typeface="Open Sans" panose="020B0606030504020204" pitchFamily="34" charset="0"/>
                 <a:cs typeface="Open Sans" panose="020B0606030504020204" pitchFamily="34" charset="0"/>
               </a:rPr>
-              <a:t>10/03/2025</a:t>
+              <a:t>06/04/2025</a:t>
             </a:fld>
             <a:endParaRPr lang="en-GB" sz="1800" b="0" i="0" kern="1200" dirty="0">
               <a:solidFill>
@@ -8168,7 +8647,7 @@
                 <a:ea typeface="Open Sans" panose="020B0606030504020204" pitchFamily="34" charset="0"/>
                 <a:cs typeface="Open Sans" panose="020B0606030504020204" pitchFamily="34" charset="0"/>
               </a:rPr>
-              <a:t>10/03/2025</a:t>
+              <a:t>06/04/2025</a:t>
             </a:fld>
             <a:endParaRPr lang="en-GB" sz="1800" b="0" i="0" kern="1200" dirty="0">
               <a:solidFill>
@@ -9938,7 +10417,7 @@
                 <a:ea typeface="Open Sans" pitchFamily="2" charset="0"/>
                 <a:cs typeface="Open Sans" pitchFamily="2" charset="0"/>
               </a:rPr>
-              <a:t>10/03/2025</a:t>
+              <a:t>06/04/2025</a:t>
             </a:fld>
             <a:endParaRPr lang="en-GB" sz="1800" b="0" i="0" kern="1200" dirty="0">
               <a:solidFill>
@@ -11688,7 +12167,7 @@
                 <a:ea typeface="Open Sans" pitchFamily="2" charset="0"/>
                 <a:cs typeface="Open Sans" pitchFamily="2" charset="0"/>
               </a:rPr>
-              <a:t>10/03/2025</a:t>
+              <a:t>06/04/2025</a:t>
             </a:fld>
             <a:endParaRPr lang="en-GB" sz="1800" b="0" i="0" kern="1200" dirty="0">
               <a:solidFill>
@@ -12205,7 +12684,7 @@
                 <a:ea typeface="Open Sans" panose="020B0606030504020204" pitchFamily="34" charset="0"/>
                 <a:cs typeface="Open Sans" panose="020B0606030504020204" pitchFamily="34" charset="0"/>
               </a:rPr>
-              <a:t>10/03/2025</a:t>
+              <a:t>06/04/2025</a:t>
             </a:fld>
             <a:endParaRPr lang="en-GB" sz="1800" b="0" i="0" kern="1200" dirty="0">
               <a:solidFill>
@@ -12802,7 +13281,7 @@
                 <a:ea typeface="Open Sans" pitchFamily="2" charset="0"/>
                 <a:cs typeface="Open Sans" pitchFamily="2" charset="0"/>
               </a:rPr>
-              <a:t>10/03/2025</a:t>
+              <a:t>06/04/2025</a:t>
             </a:fld>
             <a:endParaRPr lang="en-GB" sz="1800" b="0" i="0" kern="1200" dirty="0">
               <a:solidFill>
@@ -13342,7 +13821,7 @@
                 <a:ea typeface="Open Sans" panose="020B0606030504020204" pitchFamily="34" charset="0"/>
                 <a:cs typeface="Open Sans" panose="020B0606030504020204" pitchFamily="34" charset="0"/>
               </a:rPr>
-              <a:t>10/03/2025</a:t>
+              <a:t>06/04/2025</a:t>
             </a:fld>
             <a:endParaRPr lang="en-GB" sz="1800" b="0" i="0" kern="1200" dirty="0">
               <a:solidFill>
@@ -14043,7 +14522,7 @@
                 <a:ea typeface="Open Sans" panose="020B0606030504020204" pitchFamily="34" charset="0"/>
                 <a:cs typeface="Open Sans" panose="020B0606030504020204" pitchFamily="34" charset="0"/>
               </a:rPr>
-              <a:t>10/03/2025</a:t>
+              <a:t>06/04/2025</a:t>
             </a:fld>
             <a:endParaRPr lang="en-GB" sz="1800" b="0" i="0" kern="1200" dirty="0">
               <a:solidFill>
@@ -14406,7 +14885,7 @@
                 <a:ea typeface="Open Sans" pitchFamily="2" charset="0"/>
                 <a:cs typeface="Open Sans" pitchFamily="2" charset="0"/>
               </a:rPr>
-              <a:t>10/03/2025</a:t>
+              <a:t>06/04/2025</a:t>
             </a:fld>
             <a:endParaRPr lang="en-GB" sz="1800" b="0" i="0" kern="1200" dirty="0">
               <a:solidFill>
@@ -14801,7 +15280,7 @@
                 <a:ea typeface="Open Sans" pitchFamily="2" charset="0"/>
                 <a:cs typeface="Open Sans" pitchFamily="2" charset="0"/>
               </a:rPr>
-              <a:t>10/03/2025</a:t>
+              <a:t>06/04/2025</a:t>
             </a:fld>
             <a:endParaRPr lang="en-GB" sz="1800" b="0" i="0" kern="1200" dirty="0">
               <a:solidFill>
@@ -26676,7 +27155,13 @@
   <p:cSld>
     <p:spTree>
       <p:nvGrpSpPr>
-        <p:cNvPr id="1" name=""/>
+        <p:cNvPr id="1" name="">
+          <a:extLst>
+            <a:ext uri="{FF2B5EF4-FFF2-40B4-BE49-F238E27FC236}">
+              <a16:creationId xmlns:a16="http://schemas.microsoft.com/office/drawing/2014/main" id="{88ABE37E-05BB-8B40-B3B4-7708CD1C9FC8}"/>
+            </a:ext>
+          </a:extLst>
+        </p:cNvPr>
         <p:cNvGrpSpPr/>
         <p:nvPr/>
       </p:nvGrpSpPr>
@@ -26690,10 +27175,80 @@
       </p:grpSpPr>
       <p:sp>
         <p:nvSpPr>
-          <p:cNvPr id="7" name="Title 1">
-            <a:extLst>
-              <a:ext uri="{FF2B5EF4-FFF2-40B4-BE49-F238E27FC236}">
-                <a16:creationId xmlns:a16="http://schemas.microsoft.com/office/drawing/2014/main" id="{49EE4534-A34F-E06A-2827-12810201551C}"/>
+          <p:cNvPr id="4" name="Title 1">
+            <a:extLst>
+              <a:ext uri="{FF2B5EF4-FFF2-40B4-BE49-F238E27FC236}">
+                <a16:creationId xmlns:a16="http://schemas.microsoft.com/office/drawing/2014/main" id="{19F9A617-E695-04ED-4CB7-3E3EA3378A4F}"/>
+              </a:ext>
+            </a:extLst>
+          </p:cNvPr>
+          <p:cNvSpPr txBox="1">
+            <a:spLocks/>
+          </p:cNvSpPr>
+          <p:nvPr/>
+        </p:nvSpPr>
+        <p:spPr>
+          <a:xfrm>
+            <a:off x="878959" y="383056"/>
+            <a:ext cx="10515600" cy="853976"/>
+          </a:xfrm>
+          <a:prstGeom prst="rect">
+            <a:avLst/>
+          </a:prstGeom>
+        </p:spPr>
+        <p:txBody>
+          <a:bodyPr vert="horz" lIns="91440" tIns="45720" rIns="91440" bIns="45720" rtlCol="0" anchor="ctr">
+            <a:normAutofit/>
+          </a:bodyPr>
+          <a:lstStyle>
+            <a:lvl1pPr algn="l" defTabSz="914400" rtl="0" eaLnBrk="1" latinLnBrk="0" hangingPunct="1">
+              <a:lnSpc>
+                <a:spcPct val="90000"/>
+              </a:lnSpc>
+              <a:spcBef>
+                <a:spcPct val="0"/>
+              </a:spcBef>
+              <a:buNone/>
+              <a:defRPr sz="3600" b="1" i="0" kern="1200" cap="all" baseline="0">
+                <a:solidFill>
+                  <a:schemeClr val="tx2"/>
+                </a:solidFill>
+                <a:latin typeface="+mj-lt"/>
+                <a:ea typeface="Open Sans Semibold" panose="020B0606030504020204" pitchFamily="34" charset="0"/>
+                <a:cs typeface="Open Sans Semibold" panose="020B0606030504020204" pitchFamily="34" charset="0"/>
+              </a:defRPr>
+            </a:lvl1pPr>
+          </a:lstStyle>
+          <a:p>
+            <a:r>
+              <a:rPr lang="hr-HR" dirty="0"/>
+              <a:t>CSS </a:t>
+            </a:r>
+            <a:r>
+              <a:rPr lang="en-US" dirty="0"/>
+              <a:t>- </a:t>
+            </a:r>
+            <a:r>
+              <a:rPr lang="hr-HR" dirty="0"/>
+              <a:t>Respon</a:t>
+            </a:r>
+            <a:r>
+              <a:rPr lang="en-US" dirty="0"/>
+              <a:t>z</a:t>
+            </a:r>
+            <a:r>
+              <a:rPr lang="hr-HR" dirty="0"/>
+              <a:t>ivnost</a:t>
+            </a:r>
+          </a:p>
+        </p:txBody>
+      </p:sp>
+      <p:sp>
+        <p:nvSpPr>
+          <p:cNvPr id="6" name="Title 1">
+            <a:extLst>
+              <a:ext uri="{FF2B5EF4-FFF2-40B4-BE49-F238E27FC236}">
+                <a16:creationId xmlns:a16="http://schemas.microsoft.com/office/drawing/2014/main" id="{A684E5A3-981A-4585-8D2C-3EC036B63971}"/>
               </a:ext>
             </a:extLst>
           </p:cNvPr>
@@ -26701,307 +27256,502 @@
             <a:spLocks noGrp="1"/>
           </p:cNvSpPr>
           <p:nvPr>
-            <p:ph type="ctrTitle"/>
+            <p:ph type="title"/>
           </p:nvPr>
         </p:nvSpPr>
         <p:spPr>
           <a:xfrm>
-            <a:off x="1018954" y="929972"/>
-            <a:ext cx="9144000" cy="1013780"/>
-          </a:xfrm>
-        </p:spPr>
-        <p:txBody>
-          <a:bodyPr/>
-          <a:lstStyle/>
-          <a:p>
-            <a:pPr algn="ctr"/>
-            <a:r>
-              <a:rPr lang="en-US" dirty="0"/>
-              <a:t>ZAVR</a:t>
-            </a:r>
-            <a:r>
-              <a:rPr lang="hr-HR" dirty="0"/>
-              <a:t>š</a:t>
-            </a:r>
-            <a:r>
-              <a:rPr lang="en-US" dirty="0"/>
-              <a:t>NA VJE</a:t>
-            </a:r>
-            <a:r>
-              <a:rPr lang="hr-HR" dirty="0"/>
-              <a:t>ž</a:t>
-            </a:r>
-            <a:r>
-              <a:rPr lang="en-US" dirty="0" err="1"/>
-              <a:t>ba</a:t>
-            </a:r>
-            <a:endParaRPr lang="hr-HR" dirty="0"/>
-          </a:p>
-        </p:txBody>
-      </p:sp>
-      <p:sp>
-        <p:nvSpPr>
-          <p:cNvPr id="8" name="Text Placeholder 5">
-            <a:extLst>
-              <a:ext uri="{FF2B5EF4-FFF2-40B4-BE49-F238E27FC236}">
-                <a16:creationId xmlns:a16="http://schemas.microsoft.com/office/drawing/2014/main" id="{7E01A3E5-5B9B-91D9-36E9-040D6C05B4FB}"/>
-              </a:ext>
-            </a:extLst>
-          </p:cNvPr>
-          <p:cNvSpPr>
-            <a:spLocks noGrp="1"/>
-          </p:cNvSpPr>
-          <p:nvPr>
-            <p:ph type="subTitle" idx="1"/>
-          </p:nvPr>
-        </p:nvSpPr>
-        <p:spPr>
-          <a:xfrm>
-            <a:off x="1061483" y="2213231"/>
-            <a:ext cx="9144000" cy="1492216"/>
+            <a:off x="907377" y="971133"/>
+            <a:ext cx="5555393" cy="853976"/>
           </a:xfrm>
         </p:spPr>
         <p:txBody>
           <a:bodyPr>
-            <a:noAutofit/>
+            <a:normAutofit/>
           </a:bodyPr>
           <a:lstStyle/>
           <a:p>
             <a:r>
+              <a:rPr lang="en-US" sz="1600" dirty="0"/>
+              <a:t>BOOTSTRAP</a:t>
+            </a:r>
+            <a:endParaRPr lang="hr-HR" sz="1600" dirty="0"/>
+          </a:p>
+        </p:txBody>
+      </p:sp>
+      <p:sp>
+        <p:nvSpPr>
+          <p:cNvPr id="14" name="TextBox 13">
+            <a:extLst>
+              <a:ext uri="{FF2B5EF4-FFF2-40B4-BE49-F238E27FC236}">
+                <a16:creationId xmlns:a16="http://schemas.microsoft.com/office/drawing/2014/main" id="{020B1390-DDF4-CE39-0971-594EC9DF1373}"/>
+              </a:ext>
+            </a:extLst>
+          </p:cNvPr>
+          <p:cNvSpPr txBox="1"/>
+          <p:nvPr/>
+        </p:nvSpPr>
+        <p:spPr>
+          <a:xfrm>
+            <a:off x="907377" y="3456307"/>
+            <a:ext cx="3868478" cy="461665"/>
+          </a:xfrm>
+          <a:prstGeom prst="rect">
+            <a:avLst/>
+          </a:prstGeom>
+          <a:noFill/>
+        </p:spPr>
+        <p:txBody>
+          <a:bodyPr wrap="square">
+            <a:spAutoFit/>
+          </a:bodyPr>
+          <a:lstStyle/>
+          <a:p>
+            <a:r>
+              <a:rPr lang="hr-HR" sz="1200" dirty="0"/>
+              <a:t>💻 </a:t>
+            </a:r>
+            <a:r>
               <a:rPr lang="hr-HR" sz="1200" b="1" dirty="0"/>
-              <a:t>Zadatak: </a:t>
-            </a:r>
-            <a:r>
-              <a:rPr lang="en-US" sz="1200" b="1" dirty="0" err="1"/>
-              <a:t>Dizajnirate</a:t>
-            </a:r>
-            <a:r>
-              <a:rPr lang="en-US" sz="1200" b="1" dirty="0"/>
-              <a:t> I </a:t>
-            </a:r>
-            <a:r>
-              <a:rPr lang="en-US" sz="1200" b="1" dirty="0" err="1"/>
-              <a:t>izradite</a:t>
-            </a:r>
-            <a:r>
-              <a:rPr lang="en-US" sz="1200" b="1" dirty="0"/>
+              <a:t>Desktop</a:t>
+            </a:r>
+            <a:r>
+              <a:rPr lang="hr-HR" sz="1200" dirty="0"/>
+              <a:t> → 2 kolone (50% - 50%)</a:t>
+            </a:r>
+            <a:br>
+              <a:rPr lang="hr-HR" sz="1200" dirty="0"/>
+            </a:br>
+            <a:r>
+              <a:rPr lang="hr-HR" sz="1200" dirty="0"/>
+              <a:t>📱 </a:t>
+            </a:r>
+            <a:r>
+              <a:rPr lang="hr-HR" sz="1200" b="1" dirty="0"/>
+              <a:t>Mobilni</a:t>
+            </a:r>
+            <a:r>
+              <a:rPr lang="hr-HR" sz="1200" dirty="0"/>
+              <a:t> → Automatski prelazi u 1 kolonu</a:t>
+            </a:r>
+            <a:endParaRPr lang="en-US" sz="1200" dirty="0"/>
+          </a:p>
+        </p:txBody>
+      </p:sp>
+      <p:sp>
+        <p:nvSpPr>
+          <p:cNvPr id="10" name="TextBox 9">
+            <a:extLst>
+              <a:ext uri="{FF2B5EF4-FFF2-40B4-BE49-F238E27FC236}">
+                <a16:creationId xmlns:a16="http://schemas.microsoft.com/office/drawing/2014/main" id="{C0E91112-724E-C63C-0765-64BA77460047}"/>
+              </a:ext>
+            </a:extLst>
+          </p:cNvPr>
+          <p:cNvSpPr txBox="1"/>
+          <p:nvPr/>
+        </p:nvSpPr>
+        <p:spPr>
+          <a:xfrm>
+            <a:off x="907377" y="4203418"/>
+            <a:ext cx="3868478" cy="646331"/>
+          </a:xfrm>
+          <a:prstGeom prst="rect">
+            <a:avLst/>
+          </a:prstGeom>
+          <a:noFill/>
+        </p:spPr>
+        <p:txBody>
+          <a:bodyPr wrap="square">
+            <a:spAutoFit/>
+          </a:bodyPr>
+          <a:lstStyle/>
+          <a:p>
+            <a:r>
+              <a:rPr lang="hr-HR" sz="1200" dirty="0"/>
+              <a:t>👉</a:t>
+            </a:r>
+            <a:r>
+              <a:rPr lang="hr-HR" sz="1200" b="1" dirty="0"/>
               <a:t> </a:t>
             </a:r>
             <a:r>
-              <a:rPr lang="en-US" sz="1200" b="1" dirty="0" err="1"/>
-              <a:t>websajt</a:t>
-            </a:r>
-            <a:r>
-              <a:rPr lang="en-US" sz="1200" b="1" dirty="0"/>
-              <a:t> za video </a:t>
-            </a:r>
-            <a:r>
-              <a:rPr lang="en-US" sz="1200" b="1" dirty="0" err="1"/>
-              <a:t>klub</a:t>
-            </a:r>
-            <a:endParaRPr lang="hr-HR" sz="1200" b="1" dirty="0"/>
-          </a:p>
-          <a:p>
+              <a:rPr lang="hr-HR" sz="1200" b="1" dirty="0" err="1"/>
+              <a:t>Bootstrap</a:t>
+            </a:r>
             <a:r>
               <a:rPr lang="hr-HR" sz="1200" b="1" dirty="0"/>
-              <a:t>Cilj:</a:t>
-            </a:r>
-            <a:endParaRPr lang="hr-HR" sz="1200" dirty="0"/>
-          </a:p>
-          <a:p>
-            <a:pPr>
-              <a:buFont typeface="Arial" panose="020B0604020202020204" pitchFamily="34" charset="0"/>
-              <a:buChar char="•"/>
-            </a:pPr>
+              <a:t> pruža gotove stilove i </a:t>
+            </a:r>
+            <a:r>
+              <a:rPr lang="hr-HR" sz="1200" b="1" dirty="0" err="1"/>
+              <a:t>predefinisane</a:t>
+            </a:r>
+            <a:r>
+              <a:rPr lang="hr-HR" sz="1200" b="1" dirty="0"/>
+              <a:t> klase za jednostavan dizajn bez puno kodiranja</a:t>
+            </a:r>
+            <a:endParaRPr lang="en-US" sz="1200" dirty="0"/>
+          </a:p>
+        </p:txBody>
+      </p:sp>
+      <p:sp>
+        <p:nvSpPr>
+          <p:cNvPr id="5" name="Title 1">
+            <a:extLst>
+              <a:ext uri="{FF2B5EF4-FFF2-40B4-BE49-F238E27FC236}">
+                <a16:creationId xmlns:a16="http://schemas.microsoft.com/office/drawing/2014/main" id="{CC902A6C-644B-48F0-2EBA-8C49F3DD2DDD}"/>
+              </a:ext>
+            </a:extLst>
+          </p:cNvPr>
+          <p:cNvSpPr txBox="1">
+            <a:spLocks/>
+          </p:cNvSpPr>
+          <p:nvPr/>
+        </p:nvSpPr>
+        <p:spPr>
+          <a:xfrm>
+            <a:off x="6449902" y="954810"/>
+            <a:ext cx="5555393" cy="853976"/>
+          </a:xfrm>
+          <a:prstGeom prst="rect">
+            <a:avLst/>
+          </a:prstGeom>
+        </p:spPr>
+        <p:txBody>
+          <a:bodyPr vert="horz" lIns="91440" tIns="45720" rIns="91440" bIns="45720" rtlCol="0" anchor="ctr">
+            <a:normAutofit/>
+          </a:bodyPr>
+          <a:lstStyle>
+            <a:lvl1pPr algn="l" defTabSz="914400" rtl="0" eaLnBrk="1" latinLnBrk="0" hangingPunct="1">
+              <a:lnSpc>
+                <a:spcPct val="90000"/>
+              </a:lnSpc>
+              <a:spcBef>
+                <a:spcPct val="0"/>
+              </a:spcBef>
+              <a:buNone/>
+              <a:defRPr sz="3600" b="1" i="0" kern="1200" cap="all" baseline="0">
+                <a:solidFill>
+                  <a:schemeClr val="tx2"/>
+                </a:solidFill>
+                <a:latin typeface="+mj-lt"/>
+                <a:ea typeface="Open Sans Semibold" panose="020B0606030504020204" pitchFamily="34" charset="0"/>
+                <a:cs typeface="Open Sans Semibold" panose="020B0606030504020204" pitchFamily="34" charset="0"/>
+              </a:defRPr>
+            </a:lvl1pPr>
+          </a:lstStyle>
+          <a:p>
+            <a:r>
+              <a:rPr lang="en-US" sz="1600" dirty="0"/>
+              <a:t>ALTERNATIVE</a:t>
+            </a:r>
+            <a:endParaRPr lang="hr-HR" sz="1600" dirty="0"/>
+          </a:p>
+        </p:txBody>
+      </p:sp>
+      <p:sp>
+        <p:nvSpPr>
+          <p:cNvPr id="2" name="TextBox 1">
+            <a:extLst>
+              <a:ext uri="{FF2B5EF4-FFF2-40B4-BE49-F238E27FC236}">
+                <a16:creationId xmlns:a16="http://schemas.microsoft.com/office/drawing/2014/main" id="{36BD3988-B0C9-C25D-C493-923099091AF8}"/>
+              </a:ext>
+            </a:extLst>
+          </p:cNvPr>
+          <p:cNvSpPr txBox="1"/>
+          <p:nvPr/>
+        </p:nvSpPr>
+        <p:spPr>
+          <a:xfrm>
+            <a:off x="6449902" y="1780375"/>
+            <a:ext cx="3868478" cy="1015663"/>
+          </a:xfrm>
+          <a:prstGeom prst="rect">
+            <a:avLst/>
+          </a:prstGeom>
+          <a:noFill/>
+        </p:spPr>
+        <p:txBody>
+          <a:bodyPr wrap="square">
+            <a:spAutoFit/>
+          </a:bodyPr>
+          <a:lstStyle/>
+          <a:p>
+            <a:r>
+              <a:rPr lang="hr-HR" sz="1200" dirty="0"/>
+              <a:t>👉 </a:t>
+            </a:r>
             <a:r>
               <a:rPr lang="en-US" sz="1200" dirty="0"/>
-              <a:t>- </a:t>
-            </a:r>
-            <a:r>
-              <a:rPr lang="en-US" sz="1200" dirty="0" err="1"/>
-              <a:t>Grupno</a:t>
+              <a:t>TAILWIND CSS</a:t>
+            </a:r>
+          </a:p>
+          <a:p>
+            <a:endParaRPr lang="en-US" sz="1200" dirty="0"/>
+          </a:p>
+          <a:p>
+            <a:r>
+              <a:rPr lang="hr-HR" sz="1200" dirty="0"/>
+              <a:t>👉 </a:t>
             </a:r>
             <a:r>
               <a:rPr lang="en-US" sz="1200" dirty="0"/>
-              <a:t> </a:t>
-            </a:r>
-            <a:r>
-              <a:rPr lang="en-US" sz="1200" dirty="0" err="1"/>
-              <a:t>dizajnirate</a:t>
+              <a:t>BULMA</a:t>
+            </a:r>
+          </a:p>
+          <a:p>
+            <a:endParaRPr lang="en-US" sz="1200" dirty="0"/>
+          </a:p>
+          <a:p>
+            <a:r>
+              <a:rPr lang="hr-HR" sz="1200" dirty="0"/>
+              <a:t>👉 </a:t>
             </a:r>
             <a:r>
               <a:rPr lang="en-US" sz="1200" dirty="0"/>
-              <a:t> I </a:t>
-            </a:r>
-            <a:r>
-              <a:rPr lang="en-US" sz="1200" dirty="0" err="1"/>
-              <a:t>pojedinacno</a:t>
-            </a:r>
-            <a:r>
-              <a:rPr lang="en-US" sz="1200" dirty="0"/>
-              <a:t> </a:t>
-            </a:r>
-            <a:r>
-              <a:rPr lang="en-US" sz="1200" dirty="0" err="1"/>
-              <a:t>izradite</a:t>
-            </a:r>
-            <a:r>
-              <a:rPr lang="en-US" sz="1200" dirty="0"/>
-              <a:t> </a:t>
-            </a:r>
-            <a:r>
-              <a:rPr lang="en-US" sz="1200" dirty="0" err="1"/>
-              <a:t>websajt</a:t>
-            </a:r>
-            <a:r>
-              <a:rPr lang="en-US" sz="1200" dirty="0"/>
-              <a:t> za </a:t>
-            </a:r>
-            <a:r>
-              <a:rPr lang="en-US" sz="1200" dirty="0" err="1"/>
-              <a:t>rentanje</a:t>
-            </a:r>
-            <a:r>
-              <a:rPr lang="en-US" sz="1200" dirty="0"/>
-              <a:t> </a:t>
-            </a:r>
-            <a:r>
-              <a:rPr lang="en-US" sz="1200" dirty="0" err="1"/>
-              <a:t>filmova</a:t>
-            </a:r>
-            <a:endParaRPr lang="en-US" sz="1200" dirty="0"/>
-          </a:p>
-          <a:p>
-            <a:pPr>
-              <a:buFont typeface="Arial" panose="020B0604020202020204" pitchFamily="34" charset="0"/>
-              <a:buChar char="•"/>
-            </a:pPr>
-            <a:r>
-              <a:rPr lang="en-US" sz="1200" dirty="0"/>
-              <a:t>- </a:t>
-            </a:r>
-            <a:r>
-              <a:rPr lang="en-US" sz="1200" dirty="0" err="1"/>
-              <a:t>Izradite</a:t>
-            </a:r>
-            <a:r>
-              <a:rPr lang="en-US" sz="1200" dirty="0"/>
-              <a:t> git hub repository za </a:t>
-            </a:r>
-            <a:r>
-              <a:rPr lang="en-US" sz="1200" dirty="0" err="1"/>
-              <a:t>websajt</a:t>
-            </a:r>
-            <a:r>
-              <a:rPr lang="en-US" sz="1200" dirty="0"/>
-              <a:t> u </a:t>
-            </a:r>
-            <a:r>
-              <a:rPr lang="en-US" sz="1200" dirty="0" err="1"/>
-              <a:t>uplodujte</a:t>
-            </a:r>
-            <a:r>
-              <a:rPr lang="en-US" sz="1200" dirty="0"/>
-              <a:t> </a:t>
-            </a:r>
-            <a:r>
-              <a:rPr lang="en-US" sz="1200" dirty="0" err="1"/>
-              <a:t>sadrzaj</a:t>
-            </a:r>
-            <a:r>
-              <a:rPr lang="en-US" sz="1200" dirty="0"/>
-              <a:t> </a:t>
-            </a:r>
-            <a:r>
-              <a:rPr lang="en-US" sz="1200" dirty="0" err="1"/>
-              <a:t>websajta</a:t>
-            </a:r>
-            <a:endParaRPr lang="en-US" sz="1200" dirty="0"/>
-          </a:p>
-          <a:p>
-            <a:pPr>
-              <a:buFont typeface="Arial" panose="020B0604020202020204" pitchFamily="34" charset="0"/>
-              <a:buChar char="•"/>
-            </a:pPr>
-            <a:endParaRPr lang="en-US" sz="1200" dirty="0"/>
-          </a:p>
-          <a:p>
-            <a:pPr>
-              <a:buFont typeface="Arial" panose="020B0604020202020204" pitchFamily="34" charset="0"/>
-              <a:buChar char="•"/>
-            </a:pPr>
-            <a:r>
-              <a:rPr lang="hr-HR" sz="1200" b="1" dirty="0"/>
-              <a:t>Cilj:</a:t>
-            </a:r>
-            <a:endParaRPr lang="en-US" sz="1200" b="1" dirty="0"/>
-          </a:p>
-          <a:p>
-            <a:pPr>
-              <a:buFont typeface="Arial" panose="020B0604020202020204" pitchFamily="34" charset="0"/>
-              <a:buChar char="•"/>
-            </a:pPr>
-            <a:r>
-              <a:rPr lang="en-US" sz="1200" b="1" dirty="0"/>
-              <a:t>- </a:t>
-            </a:r>
-            <a:r>
-              <a:rPr lang="en-US" sz="1200" b="1" dirty="0" err="1"/>
-              <a:t>Filtriranje</a:t>
-            </a:r>
-            <a:r>
-              <a:rPr lang="en-US" sz="1200" b="1" dirty="0"/>
-              <a:t> po </a:t>
-            </a:r>
-            <a:r>
-              <a:rPr lang="en-US" sz="1200" b="1" dirty="0" err="1"/>
-              <a:t>zanru</a:t>
-            </a:r>
-            <a:endParaRPr lang="en-US" sz="1200" b="1" dirty="0"/>
-          </a:p>
-          <a:p>
-            <a:pPr>
-              <a:buFont typeface="Arial" panose="020B0604020202020204" pitchFamily="34" charset="0"/>
-              <a:buChar char="•"/>
-            </a:pPr>
-            <a:r>
-              <a:rPr lang="en-US" sz="1200" b="1" dirty="0"/>
-              <a:t>- </a:t>
-            </a:r>
-            <a:r>
-              <a:rPr lang="en-US" sz="1200" b="1" dirty="0" err="1"/>
-              <a:t>Filtriranje</a:t>
-            </a:r>
-            <a:r>
-              <a:rPr lang="en-US" sz="1200" b="1" dirty="0"/>
-              <a:t> da li je film </a:t>
-            </a:r>
-            <a:r>
-              <a:rPr lang="en-US" sz="1200" b="1" dirty="0" err="1"/>
-              <a:t>zauzet</a:t>
-            </a:r>
-            <a:endParaRPr lang="hr-HR" sz="1200" dirty="0"/>
-          </a:p>
-          <a:p>
-            <a:pPr>
-              <a:buFont typeface="Arial" panose="020B0604020202020204" pitchFamily="34" charset="0"/>
-              <a:buChar char="•"/>
-            </a:pPr>
-            <a:endParaRPr lang="en-US" sz="1200" dirty="0"/>
-          </a:p>
-          <a:p>
-            <a:pPr lvl="1">
-              <a:buFont typeface="Arial" panose="020B0604020202020204" pitchFamily="34" charset="0"/>
-              <a:buChar char="•"/>
-            </a:pPr>
-            <a:endParaRPr lang="en-US" sz="1600" dirty="0"/>
-          </a:p>
-        </p:txBody>
-      </p:sp>
+              <a:t>KENDO</a:t>
+            </a:r>
+          </a:p>
+        </p:txBody>
+      </p:sp>
+      <p:pic>
+        <p:nvPicPr>
+          <p:cNvPr id="9" name="Picture 8">
+            <a:extLst>
+              <a:ext uri="{FF2B5EF4-FFF2-40B4-BE49-F238E27FC236}">
+                <a16:creationId xmlns:a16="http://schemas.microsoft.com/office/drawing/2014/main" id="{08A7F8C6-6E40-C2D1-2F46-19E94E43019D}"/>
+              </a:ext>
+            </a:extLst>
+          </p:cNvPr>
+          <p:cNvPicPr>
+            <a:picLocks noChangeAspect="1"/>
+          </p:cNvPicPr>
+          <p:nvPr/>
+        </p:nvPicPr>
+        <p:blipFill>
+          <a:blip r:embed="rId3"/>
+          <a:stretch>
+            <a:fillRect/>
+          </a:stretch>
+        </p:blipFill>
+        <p:spPr>
+          <a:xfrm>
+            <a:off x="1000347" y="1808786"/>
+            <a:ext cx="3429000" cy="1362075"/>
+          </a:xfrm>
+          <a:prstGeom prst="rect">
+            <a:avLst/>
+          </a:prstGeom>
+        </p:spPr>
+      </p:pic>
     </p:spTree>
     <p:extLst>
       <p:ext uri="{BB962C8B-B14F-4D97-AF65-F5344CB8AC3E}">
-        <p14:creationId xmlns:p14="http://schemas.microsoft.com/office/powerpoint/2010/main" val="3246410904"/>
+        <p14:creationId xmlns:p14="http://schemas.microsoft.com/office/powerpoint/2010/main" val="2817480220"/>
+      </p:ext>
+    </p:extLst>
+  </p:cSld>
+  <p:clrMapOvr>
+    <a:masterClrMapping/>
+  </p:clrMapOvr>
+</p:sld>
+</file>
+
+<file path=ppt/slides/slide39.xml><?xml version="1.0" encoding="utf-8"?>
+<p:sld xmlns:a="http://schemas.openxmlformats.org/drawingml/2006/main" xmlns:r="http://schemas.openxmlformats.org/officeDocument/2006/relationships" xmlns:p="http://schemas.openxmlformats.org/presentationml/2006/main">
+  <p:cSld>
+    <p:spTree>
+      <p:nvGrpSpPr>
+        <p:cNvPr id="1" name="">
+          <a:extLst>
+            <a:ext uri="{FF2B5EF4-FFF2-40B4-BE49-F238E27FC236}">
+              <a16:creationId xmlns:a16="http://schemas.microsoft.com/office/drawing/2014/main" id="{ECE87700-610A-44FF-076E-218344E923AD}"/>
+            </a:ext>
+          </a:extLst>
+        </p:cNvPr>
+        <p:cNvGrpSpPr/>
+        <p:nvPr/>
+      </p:nvGrpSpPr>
+      <p:grpSpPr>
+        <a:xfrm>
+          <a:off x="0" y="0"/>
+          <a:ext cx="0" cy="0"/>
+          <a:chOff x="0" y="0"/>
+          <a:chExt cx="0" cy="0"/>
+        </a:xfrm>
+      </p:grpSpPr>
+      <p:sp>
+        <p:nvSpPr>
+          <p:cNvPr id="4" name="Title 1">
+            <a:extLst>
+              <a:ext uri="{FF2B5EF4-FFF2-40B4-BE49-F238E27FC236}">
+                <a16:creationId xmlns:a16="http://schemas.microsoft.com/office/drawing/2014/main" id="{BC8C3B28-B96D-B6EF-6FB3-A744F3273FD6}"/>
+              </a:ext>
+            </a:extLst>
+          </p:cNvPr>
+          <p:cNvSpPr txBox="1">
+            <a:spLocks/>
+          </p:cNvSpPr>
+          <p:nvPr/>
+        </p:nvSpPr>
+        <p:spPr>
+          <a:xfrm>
+            <a:off x="878959" y="383056"/>
+            <a:ext cx="10515600" cy="853976"/>
+          </a:xfrm>
+          <a:prstGeom prst="rect">
+            <a:avLst/>
+          </a:prstGeom>
+        </p:spPr>
+        <p:txBody>
+          <a:bodyPr vert="horz" lIns="91440" tIns="45720" rIns="91440" bIns="45720" rtlCol="0" anchor="ctr">
+            <a:normAutofit/>
+          </a:bodyPr>
+          <a:lstStyle>
+            <a:lvl1pPr algn="l" defTabSz="914400" rtl="0" eaLnBrk="1" latinLnBrk="0" hangingPunct="1">
+              <a:lnSpc>
+                <a:spcPct val="90000"/>
+              </a:lnSpc>
+              <a:spcBef>
+                <a:spcPct val="0"/>
+              </a:spcBef>
+              <a:buNone/>
+              <a:defRPr sz="3600" b="1" i="0" kern="1200" cap="all" baseline="0">
+                <a:solidFill>
+                  <a:schemeClr val="tx2"/>
+                </a:solidFill>
+                <a:latin typeface="+mj-lt"/>
+                <a:ea typeface="Open Sans Semibold" panose="020B0606030504020204" pitchFamily="34" charset="0"/>
+                <a:cs typeface="Open Sans Semibold" panose="020B0606030504020204" pitchFamily="34" charset="0"/>
+              </a:defRPr>
+            </a:lvl1pPr>
+          </a:lstStyle>
+          <a:p>
+            <a:r>
+              <a:rPr lang="hr-HR" dirty="0"/>
+              <a:t>CSS </a:t>
+            </a:r>
+            <a:r>
+              <a:rPr lang="en-US" dirty="0"/>
+              <a:t>- SASS</a:t>
+            </a:r>
+            <a:endParaRPr lang="hr-HR" dirty="0"/>
+          </a:p>
+        </p:txBody>
+      </p:sp>
+      <p:sp>
+        <p:nvSpPr>
+          <p:cNvPr id="10" name="TextBox 9">
+            <a:extLst>
+              <a:ext uri="{FF2B5EF4-FFF2-40B4-BE49-F238E27FC236}">
+                <a16:creationId xmlns:a16="http://schemas.microsoft.com/office/drawing/2014/main" id="{F0F71BC1-8370-46C9-7227-85C82887F7E5}"/>
+              </a:ext>
+            </a:extLst>
+          </p:cNvPr>
+          <p:cNvSpPr txBox="1"/>
+          <p:nvPr/>
+        </p:nvSpPr>
+        <p:spPr>
+          <a:xfrm>
+            <a:off x="907376" y="1237032"/>
+            <a:ext cx="10891333" cy="1815882"/>
+          </a:xfrm>
+          <a:prstGeom prst="rect">
+            <a:avLst/>
+          </a:prstGeom>
+          <a:noFill/>
+        </p:spPr>
+        <p:txBody>
+          <a:bodyPr wrap="square">
+            <a:spAutoFit/>
+          </a:bodyPr>
+          <a:lstStyle/>
+          <a:p>
+            <a:r>
+              <a:rPr lang="hr-HR" sz="1600" dirty="0"/>
+              <a:t>👉</a:t>
+            </a:r>
+            <a:r>
+              <a:rPr lang="hr-HR" sz="1600" b="1" dirty="0"/>
+              <a:t> Varijable: Omogućuju definiranje vrijednosti (npr. boje, veličine) koje se mogu ponovno koristiti.</a:t>
+            </a:r>
+          </a:p>
+          <a:p>
+            <a:endParaRPr lang="hr-HR" sz="1600" b="1" dirty="0"/>
+          </a:p>
+          <a:p>
+            <a:r>
+              <a:rPr lang="hr-HR" sz="1600" dirty="0"/>
+              <a:t>👉 </a:t>
+            </a:r>
+            <a:r>
+              <a:rPr lang="hr-HR" sz="1600" b="1" dirty="0"/>
+              <a:t>Ugniježđivanje: Pisanje CSS pravila unutar drugih pravila za bolju organizaciju.</a:t>
+            </a:r>
+          </a:p>
+          <a:p>
+            <a:endParaRPr lang="hr-HR" sz="1600" b="1" dirty="0"/>
+          </a:p>
+          <a:p>
+            <a:r>
+              <a:rPr lang="hr-HR" sz="1600" dirty="0"/>
+              <a:t>👉 </a:t>
+            </a:r>
+            <a:r>
+              <a:rPr lang="hr-HR" sz="1600" b="1" dirty="0"/>
+              <a:t>Mixini: Omogućuju ponovno korištenje skupova CSS deklaracija.</a:t>
+            </a:r>
+          </a:p>
+          <a:p>
+            <a:endParaRPr lang="hr-HR" sz="1600" b="1" dirty="0"/>
+          </a:p>
+          <a:p>
+            <a:r>
+              <a:rPr lang="hr-HR" sz="1600" dirty="0"/>
+              <a:t>👉 </a:t>
+            </a:r>
+            <a:r>
+              <a:rPr lang="hr-HR" sz="1600" b="1" dirty="0"/>
+              <a:t>Partials i Import: Razbijanje koda u manje, modularne datoteke koje se zatim uvoze u glavni stil.</a:t>
+            </a:r>
+            <a:endParaRPr lang="en-US" sz="1600" dirty="0"/>
+          </a:p>
+        </p:txBody>
+      </p:sp>
+      <p:pic>
+        <p:nvPicPr>
+          <p:cNvPr id="11" name="Picture 10">
+            <a:extLst>
+              <a:ext uri="{FF2B5EF4-FFF2-40B4-BE49-F238E27FC236}">
+                <a16:creationId xmlns:a16="http://schemas.microsoft.com/office/drawing/2014/main" id="{3776F856-F58F-FDE8-EBBA-49B3A9A5F255}"/>
+              </a:ext>
+            </a:extLst>
+          </p:cNvPr>
+          <p:cNvPicPr>
+            <a:picLocks noChangeAspect="1"/>
+          </p:cNvPicPr>
+          <p:nvPr/>
+        </p:nvPicPr>
+        <p:blipFill>
+          <a:blip r:embed="rId3"/>
+          <a:stretch>
+            <a:fillRect/>
+          </a:stretch>
+        </p:blipFill>
+        <p:spPr>
+          <a:xfrm>
+            <a:off x="1025364" y="3338362"/>
+            <a:ext cx="1343025" cy="466725"/>
+          </a:xfrm>
+          <a:prstGeom prst="rect">
+            <a:avLst/>
+          </a:prstGeom>
+        </p:spPr>
+      </p:pic>
+    </p:spTree>
+    <p:extLst>
+      <p:ext uri="{BB962C8B-B14F-4D97-AF65-F5344CB8AC3E}">
+        <p14:creationId xmlns:p14="http://schemas.microsoft.com/office/powerpoint/2010/main" val="1200162607"/>
       </p:ext>
     </p:extLst>
   </p:cSld>
@@ -27266,6 +28016,284 @@
     <p:extLst>
       <p:ext uri="{BB962C8B-B14F-4D97-AF65-F5344CB8AC3E}">
         <p14:creationId xmlns:p14="http://schemas.microsoft.com/office/powerpoint/2010/main" val="4089507502"/>
+      </p:ext>
+    </p:extLst>
+  </p:cSld>
+  <p:clrMapOvr>
+    <a:masterClrMapping/>
+  </p:clrMapOvr>
+</p:sld>
+</file>
+
+<file path=ppt/slides/slide40.xml><?xml version="1.0" encoding="utf-8"?>
+<p:sld xmlns:a="http://schemas.openxmlformats.org/drawingml/2006/main" xmlns:r="http://schemas.openxmlformats.org/officeDocument/2006/relationships" xmlns:p="http://schemas.openxmlformats.org/presentationml/2006/main">
+  <p:cSld>
+    <p:spTree>
+      <p:nvGrpSpPr>
+        <p:cNvPr id="1" name="">
+          <a:extLst>
+            <a:ext uri="{FF2B5EF4-FFF2-40B4-BE49-F238E27FC236}">
+              <a16:creationId xmlns:a16="http://schemas.microsoft.com/office/drawing/2014/main" id="{C9933BE7-F62F-0FF8-3677-95C4EF7912A6}"/>
+            </a:ext>
+          </a:extLst>
+        </p:cNvPr>
+        <p:cNvGrpSpPr/>
+        <p:nvPr/>
+      </p:nvGrpSpPr>
+      <p:grpSpPr>
+        <a:xfrm>
+          <a:off x="0" y="0"/>
+          <a:ext cx="0" cy="0"/>
+          <a:chOff x="0" y="0"/>
+          <a:chExt cx="0" cy="0"/>
+        </a:xfrm>
+      </p:grpSpPr>
+      <p:sp>
+        <p:nvSpPr>
+          <p:cNvPr id="4" name="Title 1">
+            <a:extLst>
+              <a:ext uri="{FF2B5EF4-FFF2-40B4-BE49-F238E27FC236}">
+                <a16:creationId xmlns:a16="http://schemas.microsoft.com/office/drawing/2014/main" id="{F66A70CF-B604-E0A8-FA7A-71A556E9B1BE}"/>
+              </a:ext>
+            </a:extLst>
+          </p:cNvPr>
+          <p:cNvSpPr txBox="1">
+            <a:spLocks/>
+          </p:cNvSpPr>
+          <p:nvPr/>
+        </p:nvSpPr>
+        <p:spPr>
+          <a:xfrm>
+            <a:off x="878959" y="383056"/>
+            <a:ext cx="10515600" cy="853976"/>
+          </a:xfrm>
+          <a:prstGeom prst="rect">
+            <a:avLst/>
+          </a:prstGeom>
+        </p:spPr>
+        <p:txBody>
+          <a:bodyPr vert="horz" lIns="91440" tIns="45720" rIns="91440" bIns="45720" rtlCol="0" anchor="ctr">
+            <a:normAutofit/>
+          </a:bodyPr>
+          <a:lstStyle>
+            <a:lvl1pPr algn="l" defTabSz="914400" rtl="0" eaLnBrk="1" latinLnBrk="0" hangingPunct="1">
+              <a:lnSpc>
+                <a:spcPct val="90000"/>
+              </a:lnSpc>
+              <a:spcBef>
+                <a:spcPct val="0"/>
+              </a:spcBef>
+              <a:buNone/>
+              <a:defRPr sz="3600" b="1" i="0" kern="1200" cap="all" baseline="0">
+                <a:solidFill>
+                  <a:schemeClr val="tx2"/>
+                </a:solidFill>
+                <a:latin typeface="+mj-lt"/>
+                <a:ea typeface="Open Sans Semibold" panose="020B0606030504020204" pitchFamily="34" charset="0"/>
+                <a:cs typeface="Open Sans Semibold" panose="020B0606030504020204" pitchFamily="34" charset="0"/>
+              </a:defRPr>
+            </a:lvl1pPr>
+          </a:lstStyle>
+          <a:p>
+            <a:r>
+              <a:rPr lang="hr-HR" dirty="0"/>
+              <a:t>CSS </a:t>
+            </a:r>
+            <a:r>
+              <a:rPr lang="en-US" dirty="0"/>
+              <a:t>- SASS</a:t>
+            </a:r>
+            <a:endParaRPr lang="hr-HR" dirty="0"/>
+          </a:p>
+        </p:txBody>
+      </p:sp>
+      <p:pic>
+        <p:nvPicPr>
+          <p:cNvPr id="3" name="Picture 2">
+            <a:extLst>
+              <a:ext uri="{FF2B5EF4-FFF2-40B4-BE49-F238E27FC236}">
+                <a16:creationId xmlns:a16="http://schemas.microsoft.com/office/drawing/2014/main" id="{7A4B0EC3-7242-8942-9915-BD3A9AF1DB18}"/>
+              </a:ext>
+            </a:extLst>
+          </p:cNvPr>
+          <p:cNvPicPr>
+            <a:picLocks noChangeAspect="1"/>
+          </p:cNvPicPr>
+          <p:nvPr/>
+        </p:nvPicPr>
+        <p:blipFill>
+          <a:blip r:embed="rId3"/>
+          <a:stretch>
+            <a:fillRect/>
+          </a:stretch>
+        </p:blipFill>
+        <p:spPr>
+          <a:xfrm>
+            <a:off x="878959" y="1342102"/>
+            <a:ext cx="3137176" cy="3483999"/>
+          </a:xfrm>
+          <a:prstGeom prst="rect">
+            <a:avLst/>
+          </a:prstGeom>
+        </p:spPr>
+      </p:pic>
+      <p:pic>
+        <p:nvPicPr>
+          <p:cNvPr id="6" name="Picture 5">
+            <a:extLst>
+              <a:ext uri="{FF2B5EF4-FFF2-40B4-BE49-F238E27FC236}">
+                <a16:creationId xmlns:a16="http://schemas.microsoft.com/office/drawing/2014/main" id="{25D525D7-5FFF-AE47-4661-422E9E83ED84}"/>
+              </a:ext>
+            </a:extLst>
+          </p:cNvPr>
+          <p:cNvPicPr>
+            <a:picLocks noChangeAspect="1"/>
+          </p:cNvPicPr>
+          <p:nvPr/>
+        </p:nvPicPr>
+        <p:blipFill>
+          <a:blip r:embed="rId4"/>
+          <a:stretch>
+            <a:fillRect/>
+          </a:stretch>
+        </p:blipFill>
+        <p:spPr>
+          <a:xfrm>
+            <a:off x="4976504" y="1342102"/>
+            <a:ext cx="3743325" cy="2447925"/>
+          </a:xfrm>
+          <a:prstGeom prst="rect">
+            <a:avLst/>
+          </a:prstGeom>
+        </p:spPr>
+      </p:pic>
+    </p:spTree>
+    <p:extLst>
+      <p:ext uri="{BB962C8B-B14F-4D97-AF65-F5344CB8AC3E}">
+        <p14:creationId xmlns:p14="http://schemas.microsoft.com/office/powerpoint/2010/main" val="1348666345"/>
+      </p:ext>
+    </p:extLst>
+  </p:cSld>
+  <p:clrMapOvr>
+    <a:masterClrMapping/>
+  </p:clrMapOvr>
+</p:sld>
+</file>
+
+<file path=ppt/slides/slide41.xml><?xml version="1.0" encoding="utf-8"?>
+<p:sld xmlns:a="http://schemas.openxmlformats.org/drawingml/2006/main" xmlns:r="http://schemas.openxmlformats.org/officeDocument/2006/relationships" xmlns:p="http://schemas.openxmlformats.org/presentationml/2006/main">
+  <p:cSld>
+    <p:spTree>
+      <p:nvGrpSpPr>
+        <p:cNvPr id="1" name=""/>
+        <p:cNvGrpSpPr/>
+        <p:nvPr/>
+      </p:nvGrpSpPr>
+      <p:grpSpPr>
+        <a:xfrm>
+          <a:off x="0" y="0"/>
+          <a:ext cx="0" cy="0"/>
+          <a:chOff x="0" y="0"/>
+          <a:chExt cx="0" cy="0"/>
+        </a:xfrm>
+      </p:grpSpPr>
+      <p:sp>
+        <p:nvSpPr>
+          <p:cNvPr id="7" name="Title 1">
+            <a:extLst>
+              <a:ext uri="{FF2B5EF4-FFF2-40B4-BE49-F238E27FC236}">
+                <a16:creationId xmlns:a16="http://schemas.microsoft.com/office/drawing/2014/main" id="{49EE4534-A34F-E06A-2827-12810201551C}"/>
+              </a:ext>
+            </a:extLst>
+          </p:cNvPr>
+          <p:cNvSpPr>
+            <a:spLocks noGrp="1"/>
+          </p:cNvSpPr>
+          <p:nvPr>
+            <p:ph type="ctrTitle"/>
+          </p:nvPr>
+        </p:nvSpPr>
+        <p:spPr>
+          <a:xfrm>
+            <a:off x="1018954" y="929972"/>
+            <a:ext cx="9144000" cy="1013780"/>
+          </a:xfrm>
+        </p:spPr>
+        <p:txBody>
+          <a:bodyPr/>
+          <a:lstStyle/>
+          <a:p>
+            <a:pPr algn="ctr"/>
+            <a:r>
+              <a:rPr lang="en-US" dirty="0"/>
+              <a:t>ZAVR</a:t>
+            </a:r>
+            <a:r>
+              <a:rPr lang="hr-HR" dirty="0"/>
+              <a:t>š</a:t>
+            </a:r>
+            <a:r>
+              <a:rPr lang="en-US" dirty="0"/>
+              <a:t>NA VJE</a:t>
+            </a:r>
+            <a:r>
+              <a:rPr lang="hr-HR" dirty="0"/>
+              <a:t>ž</a:t>
+            </a:r>
+            <a:r>
+              <a:rPr lang="en-US" dirty="0" err="1"/>
+              <a:t>ba</a:t>
+            </a:r>
+            <a:endParaRPr lang="hr-HR" dirty="0"/>
+          </a:p>
+        </p:txBody>
+      </p:sp>
+      <p:sp>
+        <p:nvSpPr>
+          <p:cNvPr id="8" name="Text Placeholder 5">
+            <a:extLst>
+              <a:ext uri="{FF2B5EF4-FFF2-40B4-BE49-F238E27FC236}">
+                <a16:creationId xmlns:a16="http://schemas.microsoft.com/office/drawing/2014/main" id="{7E01A3E5-5B9B-91D9-36E9-040D6C05B4FB}"/>
+              </a:ext>
+            </a:extLst>
+          </p:cNvPr>
+          <p:cNvSpPr>
+            <a:spLocks noGrp="1"/>
+          </p:cNvSpPr>
+          <p:nvPr>
+            <p:ph type="subTitle" idx="1"/>
+          </p:nvPr>
+        </p:nvSpPr>
+        <p:spPr>
+          <a:xfrm>
+            <a:off x="1061483" y="2213231"/>
+            <a:ext cx="9144000" cy="2701018"/>
+          </a:xfrm>
+        </p:spPr>
+        <p:txBody>
+          <a:bodyPr>
+            <a:noAutofit/>
+          </a:bodyPr>
+          <a:lstStyle/>
+          <a:p>
+            <a:r>
+              <a:rPr lang="en-US" sz="1600" dirty="0"/>
+              <a:t>ZADATAK:</a:t>
+            </a:r>
+            <a:br>
+              <a:rPr lang="en-US" sz="1600" dirty="0"/>
+            </a:br>
+            <a:r>
+              <a:rPr lang="en-US" sz="1600" dirty="0"/>
+              <a:t>https://docs.google.com/document/d/1docqD8XJ99sMyiidIl_XeWs7T5rO3MFK8oVQ7IsoDg4/edit?usp=sharing</a:t>
+            </a:r>
+          </a:p>
+        </p:txBody>
+      </p:sp>
+    </p:spTree>
+    <p:extLst>
+      <p:ext uri="{BB962C8B-B14F-4D97-AF65-F5344CB8AC3E}">
+        <p14:creationId xmlns:p14="http://schemas.microsoft.com/office/powerpoint/2010/main" val="3246410904"/>
       </p:ext>
     </p:extLst>
   </p:cSld>
@@ -29200,15 +30228,6 @@
 </file>
 
 <file path=customXml/item2.xml><?xml version="1.0" encoding="utf-8"?>
-<?mso-contentType ?>
-<FormTemplates xmlns="http://schemas.microsoft.com/sharepoint/v3/contenttype/forms">
-  <Display>DocumentLibraryForm</Display>
-  <Edit>DocumentLibraryForm</Edit>
-  <New>DocumentLibraryForm</New>
-</FormTemplates>
-</file>
-
-<file path=customXml/item3.xml><?xml version="1.0" encoding="utf-8"?>
 <ct:contentTypeSchema xmlns:ct="http://schemas.microsoft.com/office/2006/metadata/contentType" xmlns:ma="http://schemas.microsoft.com/office/2006/metadata/properties/metaAttributes" ct:_="" ma:_="" ma:contentTypeName="Document" ma:contentTypeID="0x010100E4F55D9EF0BF0A44B819E681FCAC00B7" ma:contentTypeVersion="12" ma:contentTypeDescription="Create a new document." ma:contentTypeScope="" ma:versionID="068ce121a7a7a0aebcb89dd601c4f0a2">
   <xsd:schema xmlns:xsd="http://www.w3.org/2001/XMLSchema" xmlns:xs="http://www.w3.org/2001/XMLSchema" xmlns:p="http://schemas.microsoft.com/office/2006/metadata/properties" xmlns:ns2="40806f44-bc4a-4ea4-b660-c6da93f8f179" xmlns:ns3="758d0d8f-b783-4c78-ab73-9740c97b97cf" targetNamespace="http://schemas.microsoft.com/office/2006/metadata/properties" ma:root="true" ma:fieldsID="67c58e6c5c8ea9af0822acd84d25e1a2" ns2:_="" ns3:_="">
     <xsd:import namespace="40806f44-bc4a-4ea4-b660-c6da93f8f179"/>
@@ -29425,6 +30444,15 @@
 </ct:contentTypeSchema>
 </file>
 
+<file path=customXml/item3.xml><?xml version="1.0" encoding="utf-8"?>
+<?mso-contentType ?>
+<FormTemplates xmlns="http://schemas.microsoft.com/sharepoint/v3/contenttype/forms">
+  <Display>DocumentLibraryForm</Display>
+  <Edit>DocumentLibraryForm</Edit>
+  <New>DocumentLibraryForm</New>
+</FormTemplates>
+</file>
+
 <file path=customXml/itemProps1.xml><?xml version="1.0" encoding="utf-8"?>
 <ds:datastoreItem xmlns:ds="http://schemas.openxmlformats.org/officeDocument/2006/customXml" ds:itemID="{61E72F81-8533-461E-8E71-A6D77294CFEF}">
   <ds:schemaRefs>
@@ -29443,14 +30471,6 @@
 </file>
 
 <file path=customXml/itemProps2.xml><?xml version="1.0" encoding="utf-8"?>
-<ds:datastoreItem xmlns:ds="http://schemas.openxmlformats.org/officeDocument/2006/customXml" ds:itemID="{46915D30-CAA6-465E-907F-1770D4E3B01D}">
-  <ds:schemaRefs>
-    <ds:schemaRef ds:uri="http://schemas.microsoft.com/sharepoint/v3/contenttype/forms"/>
-  </ds:schemaRefs>
-</ds:datastoreItem>
-</file>
-
-<file path=customXml/itemProps3.xml><?xml version="1.0" encoding="utf-8"?>
 <ds:datastoreItem xmlns:ds="http://schemas.openxmlformats.org/officeDocument/2006/customXml" ds:itemID="{4E6AED0F-96FF-4C7F-8AC9-672C91BFCDFE}">
   <ds:schemaRefs>
     <ds:schemaRef ds:uri="http://schemas.microsoft.com/office/2006/metadata/contentType"/>
@@ -29467,4 +30487,12 @@
     <ds:schemaRef ds:uri="http://schemas.microsoft.com/internal/obd"/>
   </ds:schemaRefs>
 </ds:datastoreItem>
+</file>
+
+<file path=customXml/itemProps3.xml><?xml version="1.0" encoding="utf-8"?>
+<ds:datastoreItem xmlns:ds="http://schemas.openxmlformats.org/officeDocument/2006/customXml" ds:itemID="{46915D30-CAA6-465E-907F-1770D4E3B01D}">
+  <ds:schemaRefs>
+    <ds:schemaRef ds:uri="http://schemas.microsoft.com/sharepoint/v3/contenttype/forms"/>
+  </ds:schemaRefs>
+</ds:datastoreItem>
 </file>
</xml_diff>